<commit_message>
Increased the font size even more .. today is the paper submission day
</commit_message>
<xml_diff>
--- a/pictures/configurations.pptx
+++ b/pictures/configurations.pptx
@@ -7,6 +7,7 @@
   <p:sldIdLst>
     <p:sldId id="256" r:id="rId2"/>
     <p:sldId id="257" r:id="rId3"/>
+    <p:sldId id="258" r:id="rId4"/>
   </p:sldIdLst>
   <p:sldSz cx="12192000" cy="6858000"/>
   <p:notesSz cx="6858000" cy="9144000"/>
@@ -260,7 +261,7 @@
           <a:p>
             <a:fld id="{D329C16F-36B5-41BD-82D4-95AA470BAA5E}" type="datetimeFigureOut">
               <a:rPr lang="en-US" smtClean="0"/>
-              <a:t>9/24/2018</a:t>
+              <a:t>9/26/2018</a:t>
             </a:fld>
             <a:endParaRPr lang="en-US"/>
           </a:p>
@@ -458,7 +459,7 @@
           <a:p>
             <a:fld id="{D329C16F-36B5-41BD-82D4-95AA470BAA5E}" type="datetimeFigureOut">
               <a:rPr lang="en-US" smtClean="0"/>
-              <a:t>9/24/2018</a:t>
+              <a:t>9/26/2018</a:t>
             </a:fld>
             <a:endParaRPr lang="en-US"/>
           </a:p>
@@ -666,7 +667,7 @@
           <a:p>
             <a:fld id="{D329C16F-36B5-41BD-82D4-95AA470BAA5E}" type="datetimeFigureOut">
               <a:rPr lang="en-US" smtClean="0"/>
-              <a:t>9/24/2018</a:t>
+              <a:t>9/26/2018</a:t>
             </a:fld>
             <a:endParaRPr lang="en-US"/>
           </a:p>
@@ -864,7 +865,7 @@
           <a:p>
             <a:fld id="{D329C16F-36B5-41BD-82D4-95AA470BAA5E}" type="datetimeFigureOut">
               <a:rPr lang="en-US" smtClean="0"/>
-              <a:t>9/24/2018</a:t>
+              <a:t>9/26/2018</a:t>
             </a:fld>
             <a:endParaRPr lang="en-US"/>
           </a:p>
@@ -1139,7 +1140,7 @@
           <a:p>
             <a:fld id="{D329C16F-36B5-41BD-82D4-95AA470BAA5E}" type="datetimeFigureOut">
               <a:rPr lang="en-US" smtClean="0"/>
-              <a:t>9/24/2018</a:t>
+              <a:t>9/26/2018</a:t>
             </a:fld>
             <a:endParaRPr lang="en-US"/>
           </a:p>
@@ -1404,7 +1405,7 @@
           <a:p>
             <a:fld id="{D329C16F-36B5-41BD-82D4-95AA470BAA5E}" type="datetimeFigureOut">
               <a:rPr lang="en-US" smtClean="0"/>
-              <a:t>9/24/2018</a:t>
+              <a:t>9/26/2018</a:t>
             </a:fld>
             <a:endParaRPr lang="en-US"/>
           </a:p>
@@ -1816,7 +1817,7 @@
           <a:p>
             <a:fld id="{D329C16F-36B5-41BD-82D4-95AA470BAA5E}" type="datetimeFigureOut">
               <a:rPr lang="en-US" smtClean="0"/>
-              <a:t>9/24/2018</a:t>
+              <a:t>9/26/2018</a:t>
             </a:fld>
             <a:endParaRPr lang="en-US"/>
           </a:p>
@@ -1957,7 +1958,7 @@
           <a:p>
             <a:fld id="{D329C16F-36B5-41BD-82D4-95AA470BAA5E}" type="datetimeFigureOut">
               <a:rPr lang="en-US" smtClean="0"/>
-              <a:t>9/24/2018</a:t>
+              <a:t>9/26/2018</a:t>
             </a:fld>
             <a:endParaRPr lang="en-US"/>
           </a:p>
@@ -2070,7 +2071,7 @@
           <a:p>
             <a:fld id="{D329C16F-36B5-41BD-82D4-95AA470BAA5E}" type="datetimeFigureOut">
               <a:rPr lang="en-US" smtClean="0"/>
-              <a:t>9/24/2018</a:t>
+              <a:t>9/26/2018</a:t>
             </a:fld>
             <a:endParaRPr lang="en-US"/>
           </a:p>
@@ -2381,7 +2382,7 @@
           <a:p>
             <a:fld id="{D329C16F-36B5-41BD-82D4-95AA470BAA5E}" type="datetimeFigureOut">
               <a:rPr lang="en-US" smtClean="0"/>
-              <a:t>9/24/2018</a:t>
+              <a:t>9/26/2018</a:t>
             </a:fld>
             <a:endParaRPr lang="en-US"/>
           </a:p>
@@ -2669,7 +2670,7 @@
           <a:p>
             <a:fld id="{D329C16F-36B5-41BD-82D4-95AA470BAA5E}" type="datetimeFigureOut">
               <a:rPr lang="en-US" smtClean="0"/>
-              <a:t>9/24/2018</a:t>
+              <a:t>9/26/2018</a:t>
             </a:fld>
             <a:endParaRPr lang="en-US"/>
           </a:p>
@@ -2910,7 +2911,7 @@
           <a:p>
             <a:fld id="{D329C16F-36B5-41BD-82D4-95AA470BAA5E}" type="datetimeFigureOut">
               <a:rPr lang="en-US" smtClean="0"/>
-              <a:t>9/24/2018</a:t>
+              <a:t>9/26/2018</a:t>
             </a:fld>
             <a:endParaRPr lang="en-US"/>
           </a:p>
@@ -3355,8 +3356,8 @@
         </p:blipFill>
         <p:spPr>
           <a:xfrm>
-            <a:off x="5097989" y="326961"/>
-            <a:ext cx="1317206" cy="5753250"/>
+            <a:off x="5097988" y="377194"/>
+            <a:ext cx="1392367" cy="5604781"/>
           </a:xfrm>
           <a:prstGeom prst="rect">
             <a:avLst/>
@@ -3391,8 +3392,8 @@
         </p:blipFill>
         <p:spPr>
           <a:xfrm>
-            <a:off x="972150" y="329682"/>
-            <a:ext cx="2465679" cy="5753250"/>
+            <a:off x="949076" y="387479"/>
+            <a:ext cx="2488753" cy="5585867"/>
           </a:xfrm>
           <a:prstGeom prst="rect">
             <a:avLst/>
@@ -3427,8 +3428,8 @@
         </p:blipFill>
         <p:spPr>
           <a:xfrm>
-            <a:off x="3437829" y="329682"/>
-            <a:ext cx="1611128" cy="5753250"/>
+            <a:off x="3379504" y="387478"/>
+            <a:ext cx="1654141" cy="5585867"/>
           </a:xfrm>
           <a:prstGeom prst="rect">
             <a:avLst/>
@@ -3463,8 +3464,8 @@
         </p:blipFill>
         <p:spPr>
           <a:xfrm>
-            <a:off x="7225391" y="321518"/>
-            <a:ext cx="1360750" cy="5758693"/>
+            <a:off x="6855073" y="377194"/>
+            <a:ext cx="1360750" cy="5651175"/>
           </a:xfrm>
           <a:prstGeom prst="rect">
             <a:avLst/>
@@ -3499,8 +3500,8 @@
         </p:blipFill>
         <p:spPr>
           <a:xfrm>
-            <a:off x="133928" y="381391"/>
-            <a:ext cx="838222" cy="5698820"/>
+            <a:off x="157002" y="381391"/>
+            <a:ext cx="792074" cy="5698820"/>
           </a:xfrm>
           <a:prstGeom prst="rect">
             <a:avLst/>
@@ -3521,8 +3522,8 @@
         </p:nvSpPr>
         <p:spPr>
           <a:xfrm>
-            <a:off x="6490355" y="2408548"/>
-            <a:ext cx="659876" cy="183823"/>
+            <a:off x="6490355" y="2426208"/>
+            <a:ext cx="333101" cy="166163"/>
           </a:xfrm>
           <a:prstGeom prst="rightArrow">
             <a:avLst/>
@@ -3585,10 +3586,10 @@
       </p:grpSpPr>
       <p:pic>
         <p:nvPicPr>
-          <p:cNvPr id="3" name="Picture 2">
-            <a:extLst>
-              <a:ext uri="{FF2B5EF4-FFF2-40B4-BE49-F238E27FC236}">
-                <a16:creationId xmlns:a16="http://schemas.microsoft.com/office/drawing/2014/main" id="{F20D7208-8126-44A1-A270-B6744B85F1B6}"/>
+          <p:cNvPr id="5" name="Picture 4">
+            <a:extLst>
+              <a:ext uri="{FF2B5EF4-FFF2-40B4-BE49-F238E27FC236}">
+                <a16:creationId xmlns:a16="http://schemas.microsoft.com/office/drawing/2014/main" id="{5886847D-6799-42B5-B450-AEFB3CC9C818}"/>
               </a:ext>
             </a:extLst>
           </p:cNvPr>
@@ -3611,8 +3612,8 @@
         </p:blipFill>
         <p:spPr>
           <a:xfrm>
-            <a:off x="972150" y="381391"/>
-            <a:ext cx="6542485" cy="5785908"/>
+            <a:off x="909948" y="418551"/>
+            <a:ext cx="3563072" cy="5927800"/>
           </a:xfrm>
           <a:prstGeom prst="rect">
             <a:avLst/>
@@ -3621,10 +3622,10 @@
       </p:pic>
       <p:pic>
         <p:nvPicPr>
-          <p:cNvPr id="4" name="Picture 3">
-            <a:extLst>
-              <a:ext uri="{FF2B5EF4-FFF2-40B4-BE49-F238E27FC236}">
-                <a16:creationId xmlns:a16="http://schemas.microsoft.com/office/drawing/2014/main" id="{B818ECFF-0243-4233-9DE8-77E88D5E2BE9}"/>
+          <p:cNvPr id="7" name="Picture 6">
+            <a:extLst>
+              <a:ext uri="{FF2B5EF4-FFF2-40B4-BE49-F238E27FC236}">
+                <a16:creationId xmlns:a16="http://schemas.microsoft.com/office/drawing/2014/main" id="{E7CF383C-0515-4520-B86A-E8968A2AC664}"/>
               </a:ext>
             </a:extLst>
           </p:cNvPr>
@@ -3647,8 +3648,44 @@
         </p:blipFill>
         <p:spPr>
           <a:xfrm>
-            <a:off x="133928" y="381391"/>
-            <a:ext cx="838222" cy="5698820"/>
+            <a:off x="4473020" y="418551"/>
+            <a:ext cx="1059868" cy="5927800"/>
+          </a:xfrm>
+          <a:prstGeom prst="rect">
+            <a:avLst/>
+          </a:prstGeom>
+        </p:spPr>
+      </p:pic>
+      <p:pic>
+        <p:nvPicPr>
+          <p:cNvPr id="8" name="Picture 7">
+            <a:extLst>
+              <a:ext uri="{FF2B5EF4-FFF2-40B4-BE49-F238E27FC236}">
+                <a16:creationId xmlns:a16="http://schemas.microsoft.com/office/drawing/2014/main" id="{3599B69D-0AF4-4204-A1D6-7DF4D19B627F}"/>
+              </a:ext>
+            </a:extLst>
+          </p:cNvPr>
+          <p:cNvPicPr>
+            <a:picLocks noChangeAspect="1"/>
+          </p:cNvPicPr>
+          <p:nvPr/>
+        </p:nvPicPr>
+        <p:blipFill>
+          <a:blip r:embed="rId4">
+            <a:extLst>
+              <a:ext uri="{28A0092B-C50C-407E-A947-70E740481C1C}">
+                <a14:useLocalDpi xmlns:a14="http://schemas.microsoft.com/office/drawing/2010/main" val="0"/>
+              </a:ext>
+            </a:extLst>
+          </a:blip>
+          <a:stretch>
+            <a:fillRect/>
+          </a:stretch>
+        </p:blipFill>
+        <p:spPr>
+          <a:xfrm>
+            <a:off x="117874" y="381391"/>
+            <a:ext cx="792074" cy="5698820"/>
           </a:xfrm>
           <a:prstGeom prst="rect">
             <a:avLst/>
@@ -3659,6 +3696,108 @@
     <p:extLst>
       <p:ext uri="{BB962C8B-B14F-4D97-AF65-F5344CB8AC3E}">
         <p14:creationId xmlns:p14="http://schemas.microsoft.com/office/powerpoint/2010/main" val="2568390905"/>
+      </p:ext>
+    </p:extLst>
+  </p:cSld>
+  <p:clrMapOvr>
+    <a:masterClrMapping/>
+  </p:clrMapOvr>
+</p:sld>
+</file>
+
+<file path=ppt/slides/slide3.xml><?xml version="1.0" encoding="utf-8"?>
+<p:sld xmlns:a="http://schemas.openxmlformats.org/drawingml/2006/main" xmlns:r="http://schemas.openxmlformats.org/officeDocument/2006/relationships" xmlns:p="http://schemas.openxmlformats.org/presentationml/2006/main">
+  <p:cSld>
+    <p:spTree>
+      <p:nvGrpSpPr>
+        <p:cNvPr id="1" name=""/>
+        <p:cNvGrpSpPr/>
+        <p:nvPr/>
+      </p:nvGrpSpPr>
+      <p:grpSpPr>
+        <a:xfrm>
+          <a:off x="0" y="0"/>
+          <a:ext cx="0" cy="0"/>
+          <a:chOff x="0" y="0"/>
+          <a:chExt cx="0" cy="0"/>
+        </a:xfrm>
+      </p:grpSpPr>
+      <p:pic>
+        <p:nvPicPr>
+          <p:cNvPr id="3" name="Picture 2">
+            <a:extLst>
+              <a:ext uri="{FF2B5EF4-FFF2-40B4-BE49-F238E27FC236}">
+                <a16:creationId xmlns:a16="http://schemas.microsoft.com/office/drawing/2014/main" id="{119A7B06-B270-431B-BFED-57274A3E9EBA}"/>
+              </a:ext>
+            </a:extLst>
+          </p:cNvPr>
+          <p:cNvPicPr>
+            <a:picLocks noChangeAspect="1"/>
+          </p:cNvPicPr>
+          <p:nvPr/>
+        </p:nvPicPr>
+        <p:blipFill>
+          <a:blip r:embed="rId2">
+            <a:extLst>
+              <a:ext uri="{28A0092B-C50C-407E-A947-70E740481C1C}">
+                <a14:useLocalDpi xmlns:a14="http://schemas.microsoft.com/office/drawing/2010/main" val="0"/>
+              </a:ext>
+            </a:extLst>
+          </a:blip>
+          <a:stretch>
+            <a:fillRect/>
+          </a:stretch>
+        </p:blipFill>
+        <p:spPr>
+          <a:xfrm>
+            <a:off x="6096000" y="438347"/>
+            <a:ext cx="5025187" cy="3652886"/>
+          </a:xfrm>
+          <a:prstGeom prst="rect">
+            <a:avLst/>
+          </a:prstGeom>
+        </p:spPr>
+      </p:pic>
+      <p:pic>
+        <p:nvPicPr>
+          <p:cNvPr id="5" name="Picture 4">
+            <a:extLst>
+              <a:ext uri="{FF2B5EF4-FFF2-40B4-BE49-F238E27FC236}">
+                <a16:creationId xmlns:a16="http://schemas.microsoft.com/office/drawing/2014/main" id="{4B9D7F64-3FB1-400F-A8E1-A09D99A269B6}"/>
+              </a:ext>
+            </a:extLst>
+          </p:cNvPr>
+          <p:cNvPicPr>
+            <a:picLocks noChangeAspect="1"/>
+          </p:cNvPicPr>
+          <p:nvPr/>
+        </p:nvPicPr>
+        <p:blipFill>
+          <a:blip r:embed="rId3">
+            <a:extLst>
+              <a:ext uri="{28A0092B-C50C-407E-A947-70E740481C1C}">
+                <a14:useLocalDpi xmlns:a14="http://schemas.microsoft.com/office/drawing/2010/main" val="0"/>
+              </a:ext>
+            </a:extLst>
+          </a:blip>
+          <a:stretch>
+            <a:fillRect/>
+          </a:stretch>
+        </p:blipFill>
+        <p:spPr>
+          <a:xfrm>
+            <a:off x="1032976" y="438347"/>
+            <a:ext cx="5063024" cy="3616914"/>
+          </a:xfrm>
+          <a:prstGeom prst="rect">
+            <a:avLst/>
+          </a:prstGeom>
+        </p:spPr>
+      </p:pic>
+    </p:spTree>
+    <p:extLst>
+      <p:ext uri="{BB962C8B-B14F-4D97-AF65-F5344CB8AC3E}">
+        <p14:creationId xmlns:p14="http://schemas.microsoft.com/office/powerpoint/2010/main" val="453272814"/>
       </p:ext>
     </p:extLst>
   </p:cSld>

</xml_diff>